<commit_message>
added bunch of references.
</commit_message>
<xml_diff>
--- a/Lectures/IF5020 Algoritma dan Pemrograman/23520050 Muhammad Anwari Leksono.pptx
+++ b/Lectures/IF5020 Algoritma dan Pemrograman/23520050 Muhammad Anwari Leksono.pptx
@@ -139,6 +139,11 @@
       </a:defRPr>
     </a:lvl9pPr>
   </p:defaultTextStyle>
+  <p:extLst>
+    <p:ext uri="{EFAFB233-063F-42B5-8137-9DF3F51BA10A}">
+      <p15:sldGuideLst xmlns:p15="http://schemas.microsoft.com/office/powerpoint/2012/main"/>
+    </p:ext>
+  </p:extLst>
 </p:presentation>
 </file>
 
@@ -289,7 +294,7 @@
           <a:p>
             <a:fld id="{D3171C41-9845-4D78-9D4B-C1644F9AB802}" type="datetimeFigureOut">
               <a:rPr lang="en-US" smtClean="0"/>
-              <a:t>9/12/2020</a:t>
+              <a:t>10/12/2020</a:t>
             </a:fld>
             <a:endParaRPr lang="en-US"/>
           </a:p>
@@ -487,7 +492,7 @@
           <a:p>
             <a:fld id="{D3171C41-9845-4D78-9D4B-C1644F9AB802}" type="datetimeFigureOut">
               <a:rPr lang="en-US" smtClean="0"/>
-              <a:t>9/12/2020</a:t>
+              <a:t>10/12/2020</a:t>
             </a:fld>
             <a:endParaRPr lang="en-US"/>
           </a:p>
@@ -695,7 +700,7 @@
           <a:p>
             <a:fld id="{D3171C41-9845-4D78-9D4B-C1644F9AB802}" type="datetimeFigureOut">
               <a:rPr lang="en-US" smtClean="0"/>
-              <a:t>9/12/2020</a:t>
+              <a:t>10/12/2020</a:t>
             </a:fld>
             <a:endParaRPr lang="en-US"/>
           </a:p>
@@ -893,7 +898,7 @@
           <a:p>
             <a:fld id="{D3171C41-9845-4D78-9D4B-C1644F9AB802}" type="datetimeFigureOut">
               <a:rPr lang="en-US" smtClean="0"/>
-              <a:t>9/12/2020</a:t>
+              <a:t>10/12/2020</a:t>
             </a:fld>
             <a:endParaRPr lang="en-US"/>
           </a:p>
@@ -1168,7 +1173,7 @@
           <a:p>
             <a:fld id="{D3171C41-9845-4D78-9D4B-C1644F9AB802}" type="datetimeFigureOut">
               <a:rPr lang="en-US" smtClean="0"/>
-              <a:t>9/12/2020</a:t>
+              <a:t>10/12/2020</a:t>
             </a:fld>
             <a:endParaRPr lang="en-US"/>
           </a:p>
@@ -1433,7 +1438,7 @@
           <a:p>
             <a:fld id="{D3171C41-9845-4D78-9D4B-C1644F9AB802}" type="datetimeFigureOut">
               <a:rPr lang="en-US" smtClean="0"/>
-              <a:t>9/12/2020</a:t>
+              <a:t>10/12/2020</a:t>
             </a:fld>
             <a:endParaRPr lang="en-US"/>
           </a:p>
@@ -1845,7 +1850,7 @@
           <a:p>
             <a:fld id="{D3171C41-9845-4D78-9D4B-C1644F9AB802}" type="datetimeFigureOut">
               <a:rPr lang="en-US" smtClean="0"/>
-              <a:t>9/12/2020</a:t>
+              <a:t>10/12/2020</a:t>
             </a:fld>
             <a:endParaRPr lang="en-US"/>
           </a:p>
@@ -1986,7 +1991,7 @@
           <a:p>
             <a:fld id="{D3171C41-9845-4D78-9D4B-C1644F9AB802}" type="datetimeFigureOut">
               <a:rPr lang="en-US" smtClean="0"/>
-              <a:t>9/12/2020</a:t>
+              <a:t>10/12/2020</a:t>
             </a:fld>
             <a:endParaRPr lang="en-US"/>
           </a:p>
@@ -2099,7 +2104,7 @@
           <a:p>
             <a:fld id="{D3171C41-9845-4D78-9D4B-C1644F9AB802}" type="datetimeFigureOut">
               <a:rPr lang="en-US" smtClean="0"/>
-              <a:t>9/12/2020</a:t>
+              <a:t>10/12/2020</a:t>
             </a:fld>
             <a:endParaRPr lang="en-US"/>
           </a:p>
@@ -2410,7 +2415,7 @@
           <a:p>
             <a:fld id="{D3171C41-9845-4D78-9D4B-C1644F9AB802}" type="datetimeFigureOut">
               <a:rPr lang="en-US" smtClean="0"/>
-              <a:t>9/12/2020</a:t>
+              <a:t>10/12/2020</a:t>
             </a:fld>
             <a:endParaRPr lang="en-US"/>
           </a:p>
@@ -2698,7 +2703,7 @@
           <a:p>
             <a:fld id="{D3171C41-9845-4D78-9D4B-C1644F9AB802}" type="datetimeFigureOut">
               <a:rPr lang="en-US" smtClean="0"/>
-              <a:t>9/12/2020</a:t>
+              <a:t>10/12/2020</a:t>
             </a:fld>
             <a:endParaRPr lang="en-US"/>
           </a:p>
@@ -2939,7 +2944,7 @@
           <a:p>
             <a:fld id="{D3171C41-9845-4D78-9D4B-C1644F9AB802}" type="datetimeFigureOut">
               <a:rPr lang="en-US" smtClean="0"/>
-              <a:t>9/12/2020</a:t>
+              <a:t>10/12/2020</a:t>
             </a:fld>
             <a:endParaRPr lang="en-US"/>
           </a:p>
@@ -8229,8 +8234,8 @@
           </a:p>
         </p:txBody>
       </p:sp>
-      <mc:AlternateContent xmlns:mc="http://schemas.openxmlformats.org/markup-compatibility/2006">
-        <mc:Choice xmlns:a14="http://schemas.microsoft.com/office/drawing/2010/main" Requires="a14">
+      <mc:AlternateContent xmlns:mc="http://schemas.openxmlformats.org/markup-compatibility/2006" xmlns:a14="http://schemas.microsoft.com/office/drawing/2010/main">
+        <mc:Choice Requires="a14">
           <p:sp>
             <p:nvSpPr>
               <p:cNvPr id="3" name="Content Placeholder 2">
@@ -8984,7 +8989,7 @@
             </p:txBody>
           </p:sp>
         </mc:Choice>
-        <mc:Fallback>
+        <mc:Fallback xmlns="">
           <p:sp>
             <p:nvSpPr>
               <p:cNvPr id="3" name="Content Placeholder 2">
@@ -9082,8 +9087,8 @@
           </a:p>
         </p:txBody>
       </p:sp>
-      <mc:AlternateContent xmlns:mc="http://schemas.openxmlformats.org/markup-compatibility/2006">
-        <mc:Choice xmlns:a14="http://schemas.microsoft.com/office/drawing/2010/main" Requires="a14">
+      <mc:AlternateContent xmlns:mc="http://schemas.openxmlformats.org/markup-compatibility/2006" xmlns:a14="http://schemas.microsoft.com/office/drawing/2010/main">
+        <mc:Choice Requires="a14">
           <p:sp>
             <p:nvSpPr>
               <p:cNvPr id="3" name="Content Placeholder 2">
@@ -9776,7 +9781,7 @@
             </p:txBody>
           </p:sp>
         </mc:Choice>
-        <mc:Fallback>
+        <mc:Fallback xmlns="">
           <p:sp>
             <p:nvSpPr>
               <p:cNvPr id="3" name="Content Placeholder 2">
@@ -9874,8 +9879,8 @@
           </a:p>
         </p:txBody>
       </p:sp>
-      <mc:AlternateContent xmlns:mc="http://schemas.openxmlformats.org/markup-compatibility/2006">
-        <mc:Choice xmlns:a14="http://schemas.microsoft.com/office/drawing/2010/main" Requires="a14">
+      <mc:AlternateContent xmlns:mc="http://schemas.openxmlformats.org/markup-compatibility/2006" xmlns:a14="http://schemas.microsoft.com/office/drawing/2010/main">
+        <mc:Choice Requires="a14">
           <p:sp>
             <p:nvSpPr>
               <p:cNvPr id="3" name="Content Placeholder 2">
@@ -10445,7 +10450,7 @@
             </p:txBody>
           </p:sp>
         </mc:Choice>
-        <mc:Fallback>
+        <mc:Fallback xmlns="">
           <p:sp>
             <p:nvSpPr>
               <p:cNvPr id="3" name="Content Placeholder 2">
@@ -10717,8 +10722,8 @@
           </a:p>
         </p:txBody>
       </p:sp>
-      <mc:AlternateContent xmlns:mc="http://schemas.openxmlformats.org/markup-compatibility/2006">
-        <mc:Choice xmlns:a14="http://schemas.microsoft.com/office/drawing/2010/main" Requires="a14">
+      <mc:AlternateContent xmlns:mc="http://schemas.openxmlformats.org/markup-compatibility/2006" xmlns:a14="http://schemas.microsoft.com/office/drawing/2010/main">
+        <mc:Choice Requires="a14">
           <p:sp>
             <p:nvSpPr>
               <p:cNvPr id="3" name="Content Placeholder 2">
@@ -10862,14 +10867,7 @@
                         <m:nor/>
                       </m:rPr>
                       <a:rPr lang="en-US" i="1" dirty="0" smtClean="0"/>
-                      <m:t> }</m:t>
-                    </m:r>
-                    <m:r>
-                      <m:rPr>
-                        <m:nor/>
-                      </m:rPr>
-                      <a:rPr lang="en-US" b="0" i="1" dirty="0" smtClean="0"/>
-                      <m:t> </m:t>
+                      <m:t> } </m:t>
                     </m:r>
                   </m:oMath>
                 </a14:m>
@@ -11447,7 +11445,7 @@
             </p:txBody>
           </p:sp>
         </mc:Choice>
-        <mc:Fallback>
+        <mc:Fallback xmlns="">
           <p:sp>
             <p:nvSpPr>
               <p:cNvPr id="3" name="Content Placeholder 2">
@@ -11517,8 +11515,8 @@
           <a:chExt cx="0" cy="0"/>
         </a:xfrm>
       </p:grpSpPr>
-      <mc:AlternateContent xmlns:mc="http://schemas.openxmlformats.org/markup-compatibility/2006">
-        <mc:Choice xmlns:a14="http://schemas.microsoft.com/office/drawing/2010/main" Requires="a14">
+      <mc:AlternateContent xmlns:mc="http://schemas.openxmlformats.org/markup-compatibility/2006" xmlns:a14="http://schemas.microsoft.com/office/drawing/2010/main">
+        <mc:Choice Requires="a14">
           <p:sp>
             <p:nvSpPr>
               <p:cNvPr id="3" name="Content Placeholder 2">
@@ -12453,7 +12451,7 @@
             </p:txBody>
           </p:sp>
         </mc:Choice>
-        <mc:Fallback>
+        <mc:Fallback xmlns="">
           <p:sp>
             <p:nvSpPr>
               <p:cNvPr id="3" name="Content Placeholder 2">
@@ -12555,8 +12553,8 @@
           </a:p>
         </p:txBody>
       </p:sp>
-      <mc:AlternateContent xmlns:mc="http://schemas.openxmlformats.org/markup-compatibility/2006">
-        <mc:Choice xmlns:a14="http://schemas.microsoft.com/office/drawing/2010/main" Requires="a14">
+      <mc:AlternateContent xmlns:mc="http://schemas.openxmlformats.org/markup-compatibility/2006" xmlns:a14="http://schemas.microsoft.com/office/drawing/2010/main">
+        <mc:Choice Requires="a14">
           <p:sp>
             <p:nvSpPr>
               <p:cNvPr id="3" name="Content Placeholder 2">
@@ -13037,7 +13035,7 @@
             </p:txBody>
           </p:sp>
         </mc:Choice>
-        <mc:Fallback>
+        <mc:Fallback xmlns="">
           <p:sp>
             <p:nvSpPr>
               <p:cNvPr id="3" name="Content Placeholder 2">
@@ -15663,6 +15661,38 @@
                 </a:r>
                 <a:r>
                   <a:rPr lang="en-US" dirty="0"/>
+                  <a:t> T dan </a:t>
+                </a:r>
+                <a:r>
+                  <a:rPr lang="en-US" i="1" dirty="0"/>
+                  <a:t>m</a:t>
+                </a:r>
+                <a:r>
+                  <a:rPr lang="en-US" dirty="0"/>
+                  <a:t> </a:t>
+                </a:r>
+                <a:r>
+                  <a:rPr lang="en-US" dirty="0" err="1"/>
+                  <a:t>adalah</a:t>
+                </a:r>
+                <a:r>
+                  <a:rPr lang="en-US" dirty="0"/>
+                  <a:t> jumlah slot yang </a:t>
+                </a:r>
+                <a:r>
+                  <a:rPr lang="en-US" dirty="0" err="1"/>
+                  <a:t>dimiliki</a:t>
+                </a:r>
+                <a:r>
+                  <a:rPr lang="en-US" dirty="0"/>
+                  <a:t> </a:t>
+                </a:r>
+                <a:r>
+                  <a:rPr lang="en-US" dirty="0" err="1"/>
+                  <a:t>tabel</a:t>
+                </a:r>
+                <a:r>
+                  <a:rPr lang="en-US" dirty="0"/>
                   <a:t> T. </a:t>
                 </a:r>
               </a:p>
@@ -16000,8 +16030,8 @@
                   <a:t> pada kali ke-</a:t>
                 </a:r>
                 <a:r>
-                  <a:rPr lang="en-US" i="1" dirty="0"/>
-                  <a:t>I</a:t>
+                  <a:rPr lang="en-US" i="1" dirty="0" err="1"/>
+                  <a:t>i</a:t>
                 </a:r>
                 <a:r>
                   <a:rPr lang="en-US" dirty="0"/>
@@ -16244,8 +16274,8 @@
           </a:p>
         </p:txBody>
       </p:sp>
-      <mc:AlternateContent xmlns:mc="http://schemas.openxmlformats.org/markup-compatibility/2006">
-        <mc:Choice xmlns:a14="http://schemas.microsoft.com/office/drawing/2010/main" Requires="a14">
+      <mc:AlternateContent xmlns:mc="http://schemas.openxmlformats.org/markup-compatibility/2006" xmlns:a14="http://schemas.microsoft.com/office/drawing/2010/main">
+        <mc:Choice Requires="a14">
           <p:sp>
             <p:nvSpPr>
               <p:cNvPr id="3" name="Content Placeholder 2">
@@ -16662,7 +16692,7 @@
             </p:txBody>
           </p:sp>
         </mc:Choice>
-        <mc:Fallback>
+        <mc:Fallback xmlns="">
           <p:sp>
             <p:nvSpPr>
               <p:cNvPr id="3" name="Content Placeholder 2">
@@ -16852,8 +16882,8 @@
           </a:p>
         </p:txBody>
       </p:sp>
-      <mc:AlternateContent xmlns:mc="http://schemas.openxmlformats.org/markup-compatibility/2006">
-        <mc:Choice xmlns:a14="http://schemas.microsoft.com/office/drawing/2010/main" Requires="a14">
+      <mc:AlternateContent xmlns:mc="http://schemas.openxmlformats.org/markup-compatibility/2006" xmlns:a14="http://schemas.microsoft.com/office/drawing/2010/main">
+        <mc:Choice Requires="a14">
           <p:sp>
             <p:nvSpPr>
               <p:cNvPr id="3" name="Content Placeholder 2">
@@ -16953,14 +16983,7 @@
                       <a:rPr lang="en-US" b="0" i="1" smtClean="0">
                         <a:latin typeface="Cambria Math" panose="02040503050406030204" pitchFamily="18" charset="0"/>
                       </a:rPr>
-                      <m:t> →{0, 1, 2,</m:t>
-                    </m:r>
-                    <m:r>
-                      <a:rPr lang="en-US" b="0" i="1" smtClean="0">
-                        <a:latin typeface="Cambria Math" panose="02040503050406030204" pitchFamily="18" charset="0"/>
-                        <a:ea typeface="Cambria Math" panose="02040503050406030204" pitchFamily="18" charset="0"/>
-                      </a:rPr>
-                      <m:t> 3, …, </m:t>
+                      <m:t> →{0, 1, 2, 3, …, </m:t>
                     </m:r>
                     <m:d>
                       <m:dPr>
@@ -17636,7 +17659,7 @@
             </p:txBody>
           </p:sp>
         </mc:Choice>
-        <mc:Fallback>
+        <mc:Fallback xmlns="">
           <p:sp>
             <p:nvSpPr>
               <p:cNvPr id="3" name="Content Placeholder 2">
@@ -17734,8 +17757,8 @@
           </a:p>
         </p:txBody>
       </p:sp>
-      <mc:AlternateContent xmlns:mc="http://schemas.openxmlformats.org/markup-compatibility/2006">
-        <mc:Choice xmlns:a14="http://schemas.microsoft.com/office/drawing/2010/main" Requires="a14">
+      <mc:AlternateContent xmlns:mc="http://schemas.openxmlformats.org/markup-compatibility/2006" xmlns:a14="http://schemas.microsoft.com/office/drawing/2010/main">
+        <mc:Choice Requires="a14">
           <p:sp>
             <p:nvSpPr>
               <p:cNvPr id="3" name="Content Placeholder 2">
@@ -18217,7 +18240,7 @@
             </p:txBody>
           </p:sp>
         </mc:Choice>
-        <mc:Fallback>
+        <mc:Fallback xmlns="">
           <p:sp>
             <p:nvSpPr>
               <p:cNvPr id="3" name="Content Placeholder 2">
@@ -18315,8 +18338,8 @@
           </a:p>
         </p:txBody>
       </p:sp>
-      <mc:AlternateContent xmlns:mc="http://schemas.openxmlformats.org/markup-compatibility/2006">
-        <mc:Choice xmlns:a14="http://schemas.microsoft.com/office/drawing/2010/main" Requires="a14">
+      <mc:AlternateContent xmlns:mc="http://schemas.openxmlformats.org/markup-compatibility/2006" xmlns:a14="http://schemas.microsoft.com/office/drawing/2010/main">
+        <mc:Choice Requires="a14">
           <p:sp>
             <p:nvSpPr>
               <p:cNvPr id="3" name="Content Placeholder 2">
@@ -18895,7 +18918,7 @@
             </p:txBody>
           </p:sp>
         </mc:Choice>
-        <mc:Fallback>
+        <mc:Fallback xmlns="">
           <p:sp>
             <p:nvSpPr>
               <p:cNvPr id="3" name="Content Placeholder 2">
@@ -18965,8 +18988,8 @@
           <a:chExt cx="0" cy="0"/>
         </a:xfrm>
       </p:grpSpPr>
-      <mc:AlternateContent xmlns:mc="http://schemas.openxmlformats.org/markup-compatibility/2006">
-        <mc:Choice xmlns:a14="http://schemas.microsoft.com/office/drawing/2010/main" Requires="a14">
+      <mc:AlternateContent xmlns:mc="http://schemas.openxmlformats.org/markup-compatibility/2006" xmlns:a14="http://schemas.microsoft.com/office/drawing/2010/main">
+        <mc:Choice Requires="a14">
           <p:sp>
             <p:nvSpPr>
               <p:cNvPr id="3" name="Content Placeholder 2">
@@ -19105,13 +19128,7 @@
                       <a:rPr lang="en-US" b="0" i="1" smtClean="0">
                         <a:latin typeface="Cambria Math" panose="02040503050406030204" pitchFamily="18" charset="0"/>
                       </a:rPr>
-                      <m:t>=</m:t>
-                    </m:r>
-                    <m:r>
-                      <a:rPr lang="en-US" b="0" i="1" smtClean="0">
-                        <a:latin typeface="Cambria Math" panose="02040503050406030204" pitchFamily="18" charset="0"/>
-                      </a:rPr>
-                      <m:t>1+(</m:t>
+                      <m:t>=1+(</m:t>
                     </m:r>
                     <m:r>
                       <a:rPr lang="en-US" b="0" i="1" smtClean="0">
@@ -19343,19 +19360,7 @@
                       <a:rPr lang="en-US" b="0" i="1" smtClean="0">
                         <a:latin typeface="Cambria Math" panose="02040503050406030204" pitchFamily="18" charset="0"/>
                       </a:rPr>
-                      <m:t>=</m:t>
-                    </m:r>
-                    <m:r>
-                      <a:rPr lang="en-US" b="0" i="1" smtClean="0">
-                        <a:latin typeface="Cambria Math" panose="02040503050406030204" pitchFamily="18" charset="0"/>
-                      </a:rPr>
-                      <m:t>123456</m:t>
-                    </m:r>
-                    <m:r>
-                      <a:rPr lang="en-US" b="0" i="1" smtClean="0">
-                        <a:latin typeface="Cambria Math" panose="02040503050406030204" pitchFamily="18" charset="0"/>
-                      </a:rPr>
-                      <m:t> </m:t>
+                      <m:t>=123456 </m:t>
                     </m:r>
                     <m:r>
                       <a:rPr lang="en-US" b="0" i="1" smtClean="0">
@@ -19425,13 +19430,7 @@
                           <a:rPr lang="en-US" b="0" i="1" smtClean="0">
                             <a:latin typeface="Cambria Math" panose="02040503050406030204" pitchFamily="18" charset="0"/>
                           </a:rPr>
-                          <m:t>123456</m:t>
-                        </m:r>
-                        <m:r>
-                          <a:rPr lang="en-US" b="0" i="1" smtClean="0">
-                            <a:latin typeface="Cambria Math" panose="02040503050406030204" pitchFamily="18" charset="0"/>
-                          </a:rPr>
-                          <m:t> </m:t>
+                          <m:t>123456 </m:t>
                         </m:r>
                         <m:r>
                           <a:rPr lang="en-US" b="0" i="1" smtClean="0">
@@ -19500,13 +19499,7 @@
                       <a:rPr lang="en-US" b="0" i="1" smtClean="0">
                         <a:latin typeface="Cambria Math" panose="02040503050406030204" pitchFamily="18" charset="0"/>
                       </a:rPr>
-                      <m:t>=</m:t>
-                    </m:r>
-                    <m:r>
-                      <a:rPr lang="en-US" b="0" i="1" smtClean="0">
-                        <a:latin typeface="Cambria Math" panose="02040503050406030204" pitchFamily="18" charset="0"/>
-                      </a:rPr>
-                      <m:t>123456 </m:t>
+                      <m:t>=123456 </m:t>
                     </m:r>
                     <m:r>
                       <a:rPr lang="en-US" b="0" i="1" smtClean="0">
@@ -19552,13 +19545,7 @@
                           <a:rPr lang="en-US" b="0" i="1" smtClean="0">
                             <a:latin typeface="Cambria Math" panose="02040503050406030204" pitchFamily="18" charset="0"/>
                           </a:rPr>
-                          <m:t>123456</m:t>
-                        </m:r>
-                        <m:r>
-                          <a:rPr lang="en-US" b="0" i="1" smtClean="0">
-                            <a:latin typeface="Cambria Math" panose="02040503050406030204" pitchFamily="18" charset="0"/>
-                          </a:rPr>
-                          <m:t> </m:t>
+                          <m:t>123456 </m:t>
                         </m:r>
                         <m:r>
                           <a:rPr lang="en-US" b="0" i="1" smtClean="0">
@@ -19759,7 +19746,7 @@
             </p:txBody>
           </p:sp>
         </mc:Choice>
-        <mc:Fallback>
+        <mc:Fallback xmlns="">
           <p:sp>
             <p:nvSpPr>
               <p:cNvPr id="3" name="Content Placeholder 2">
@@ -19865,8 +19852,8 @@
           </a:p>
         </p:txBody>
       </p:sp>
-      <mc:AlternateContent xmlns:mc="http://schemas.openxmlformats.org/markup-compatibility/2006">
-        <mc:Choice xmlns:a14="http://schemas.microsoft.com/office/drawing/2010/main" Requires="a14">
+      <mc:AlternateContent xmlns:mc="http://schemas.openxmlformats.org/markup-compatibility/2006" xmlns:a14="http://schemas.microsoft.com/office/drawing/2010/main">
+        <mc:Choice Requires="a14">
           <p:sp>
             <p:nvSpPr>
               <p:cNvPr id="3" name="Content Placeholder 2">
@@ -20821,13 +20808,7 @@
                       <a:rPr lang="en-US" b="0" i="1" smtClean="0">
                         <a:latin typeface="Cambria Math" panose="02040503050406030204" pitchFamily="18" charset="0"/>
                       </a:rPr>
-                      <m:t>=</m:t>
-                    </m:r>
-                    <m:r>
-                      <a:rPr lang="en-US" b="0" i="1" smtClean="0">
-                        <a:latin typeface="Cambria Math" panose="02040503050406030204" pitchFamily="18" charset="0"/>
-                      </a:rPr>
-                      <m:t> </m:t>
+                      <m:t>= </m:t>
                     </m:r>
                     <m:f>
                       <m:fPr>
@@ -20900,7 +20881,7 @@
             </p:txBody>
           </p:sp>
         </mc:Choice>
-        <mc:Fallback>
+        <mc:Fallback xmlns="">
           <p:sp>
             <p:nvSpPr>
               <p:cNvPr id="3" name="Content Placeholder 2">
@@ -20970,8 +20951,8 @@
           <a:chExt cx="0" cy="0"/>
         </a:xfrm>
       </p:grpSpPr>
-      <mc:AlternateContent xmlns:mc="http://schemas.openxmlformats.org/markup-compatibility/2006">
-        <mc:Choice xmlns:a14="http://schemas.microsoft.com/office/drawing/2010/main" Requires="a14">
+      <mc:AlternateContent xmlns:mc="http://schemas.openxmlformats.org/markup-compatibility/2006" xmlns:a14="http://schemas.microsoft.com/office/drawing/2010/main">
+        <mc:Choice Requires="a14">
           <p:sp>
             <p:nvSpPr>
               <p:cNvPr id="3" name="Content Placeholder 2">
@@ -22405,7 +22386,7 @@
             </p:txBody>
           </p:sp>
         </mc:Choice>
-        <mc:Fallback>
+        <mc:Fallback xmlns="">
           <p:sp>
             <p:nvSpPr>
               <p:cNvPr id="3" name="Content Placeholder 2">

</xml_diff>